<commit_message>
Remove obsolete log files and update poster presentations
</commit_message>
<xml_diff>
--- a/Poster.pptx
+++ b/Poster.pptx
@@ -4975,8 +4975,8 @@
         </p:nvSpPr>
         <p:spPr bwMode="auto">
           <a:xfrm>
-            <a:off x="137160" y="3920359"/>
-            <a:ext cx="6202680" cy="4355038"/>
+            <a:off x="137160" y="3889581"/>
+            <a:ext cx="6202680" cy="4416594"/>
           </a:xfrm>
           <a:prstGeom prst="rect">
             <a:avLst/>
@@ -5041,7 +5041,20 @@
               <a:tabLst/>
             </a:pPr>
             <a:r>
-              <a:rPr kumimoji="0" lang="en-US" altLang="en-US" sz="2000" b="1" i="0" u="none" strike="noStrike" cap="none" normalizeH="0" baseline="0">
+              <a:rPr kumimoji="0" lang="en-US" altLang="en-US" sz="2200" b="1" i="0" u="none" strike="noStrike" cap="none" normalizeH="0" baseline="0" dirty="0">
+                <a:ln>
+                  <a:noFill/>
+                </a:ln>
+                <a:solidFill>
+                  <a:srgbClr val="C00000"/>
+                </a:solidFill>
+                <a:effectLst/>
+                <a:latin typeface="Georgia Pro" panose="02040502050405020303" pitchFamily="18" charset="0"/>
+              </a:rPr>
+              <a:t>The Promise:</a:t>
+            </a:r>
+            <a:r>
+              <a:rPr kumimoji="0" lang="en-US" altLang="en-US" sz="2200" b="0" i="0" u="none" strike="noStrike" cap="none" normalizeH="0" baseline="0" dirty="0">
                 <a:ln>
                   <a:noFill/>
                 </a:ln>
@@ -5051,10 +5064,10 @@
                 <a:effectLst/>
                 <a:latin typeface="Georgia Pro" panose="02040502050405020303" pitchFamily="18" charset="0"/>
               </a:rPr>
-              <a:t>The Promise:</a:t>
-            </a:r>
-            <a:r>
-              <a:rPr kumimoji="0" lang="en-US" altLang="en-US" sz="2000" b="0" i="0" u="none" strike="noStrike" cap="none" normalizeH="0" baseline="0">
+              <a:t> </a:t>
+            </a:r>
+            <a:r>
+              <a:rPr kumimoji="0" lang="en-US" altLang="en-US" sz="2000" b="0" i="0" u="none" strike="noStrike" cap="none" normalizeH="0" baseline="0" dirty="0">
                 <a:ln>
                   <a:noFill/>
                 </a:ln>
@@ -5064,7 +5077,7 @@
                 <a:effectLst/>
                 <a:latin typeface="Georgia Pro" panose="02040502050405020303" pitchFamily="18" charset="0"/>
               </a:rPr>
-              <a:t> Mass Spectrometry Imaging (MSI) is revolutionizing medicine. It allows us to map the spatial distribution of molecules in tissue, aiding in disease detection (like cancer), drug monitoring, and compound annotation.</a:t>
+              <a:t>Mass Spectrometry Imaging (MSI) is revolutionizing medicine. It allows us to map the spatial distribution of molecules in tissue, aiding in disease detection (like cancer), drug monitoring, and compound annotation.</a:t>
             </a:r>
           </a:p>
           <a:p>
@@ -5085,7 +5098,20 @@
               <a:tabLst/>
             </a:pPr>
             <a:r>
-              <a:rPr kumimoji="0" lang="en-US" altLang="en-US" sz="2000" b="1" i="0" u="none" strike="noStrike" cap="none" normalizeH="0" baseline="0">
+              <a:rPr kumimoji="0" lang="en-US" altLang="en-US" sz="2200" b="1" i="0" u="none" strike="noStrike" cap="none" normalizeH="0" baseline="0" dirty="0">
+                <a:ln>
+                  <a:noFill/>
+                </a:ln>
+                <a:solidFill>
+                  <a:srgbClr val="C00000"/>
+                </a:solidFill>
+                <a:effectLst/>
+                <a:latin typeface="Georgia Pro" panose="02040502050405020303" pitchFamily="18" charset="0"/>
+              </a:rPr>
+              <a:t>The Data Structure:</a:t>
+            </a:r>
+            <a:r>
+              <a:rPr kumimoji="0" lang="en-US" altLang="en-US" sz="2200" b="0" i="0" u="none" strike="noStrike" cap="none" normalizeH="0" baseline="0" dirty="0">
                 <a:ln>
                   <a:noFill/>
                 </a:ln>
@@ -5095,10 +5121,10 @@
                 <a:effectLst/>
                 <a:latin typeface="Georgia Pro" panose="02040502050405020303" pitchFamily="18" charset="0"/>
               </a:rPr>
-              <a:t>The Data Structure:</a:t>
-            </a:r>
-            <a:r>
-              <a:rPr kumimoji="0" lang="en-US" altLang="en-US" sz="2000" b="0" i="0" u="none" strike="noStrike" cap="none" normalizeH="0" baseline="0">
+              <a:t> </a:t>
+            </a:r>
+            <a:r>
+              <a:rPr kumimoji="0" lang="en-US" altLang="en-US" sz="2000" b="0" i="0" u="none" strike="noStrike" cap="none" normalizeH="0" baseline="0" dirty="0">
                 <a:ln>
                   <a:noFill/>
                 </a:ln>
@@ -5108,15 +5134,15 @@
                 <a:effectLst/>
                 <a:latin typeface="Georgia Pro" panose="02040502050405020303" pitchFamily="18" charset="0"/>
               </a:rPr>
-              <a:t> Imagine a digital image, but instead of just Red, Green, and Blue, every single pixel contains a spectrum of thousands of chemical values. This creates a massive </a:t>
-            </a:r>
-            <a:r>
-              <a:rPr kumimoji="0" lang="en-US" altLang="en-US" sz="2000" b="1" i="0" u="none" strike="noStrike" cap="none" normalizeH="0" baseline="0">
+              <a:t>Imagine a digital image, but instead of just Red, Green, and Blue, every single pixel contains a spectrum of thousands of chemical values. This creates a massive </a:t>
+            </a:r>
+            <a:r>
+              <a:rPr kumimoji="0" lang="en-US" altLang="en-US" sz="2000" b="1" i="0" u="none" strike="noStrike" cap="none" normalizeH="0" baseline="0" dirty="0">
                 <a:ln>
                   <a:noFill/>
                 </a:ln>
                 <a:solidFill>
-                  <a:schemeClr val="tx1"/>
+                  <a:srgbClr val="00B050"/>
                 </a:solidFill>
                 <a:effectLst/>
                 <a:latin typeface="Georgia Pro" panose="02040502050405020303" pitchFamily="18" charset="0"/>
@@ -5124,7 +5150,7 @@
               <a:t>3D Data Cube</a:t>
             </a:r>
             <a:r>
-              <a:rPr kumimoji="0" lang="en-US" altLang="en-US" sz="2000" b="0" i="0" u="none" strike="noStrike" cap="none" normalizeH="0" baseline="0">
+              <a:rPr kumimoji="0" lang="en-US" altLang="en-US" sz="2000" b="0" i="0" u="none" strike="noStrike" cap="none" normalizeH="0" baseline="0" dirty="0">
                 <a:ln>
                   <a:noFill/>
                 </a:ln>
@@ -5155,7 +5181,20 @@
               <a:tabLst/>
             </a:pPr>
             <a:r>
-              <a:rPr kumimoji="0" lang="en-US" altLang="en-US" sz="2000" b="1" i="0" u="none" strike="noStrike" cap="none" normalizeH="0" baseline="0">
+              <a:rPr kumimoji="0" lang="en-US" altLang="en-US" sz="2200" b="1" i="0" u="none" strike="noStrike" cap="none" normalizeH="0" baseline="0" dirty="0">
+                <a:ln>
+                  <a:noFill/>
+                </a:ln>
+                <a:solidFill>
+                  <a:srgbClr val="C00000"/>
+                </a:solidFill>
+                <a:effectLst/>
+                <a:latin typeface="Georgia Pro" panose="02040502050405020303" pitchFamily="18" charset="0"/>
+              </a:rPr>
+              <a:t>The Bottleneck:</a:t>
+            </a:r>
+            <a:r>
+              <a:rPr kumimoji="0" lang="en-US" altLang="en-US" sz="2200" b="0" i="0" u="none" strike="noStrike" cap="none" normalizeH="0" baseline="0" dirty="0">
                 <a:ln>
                   <a:noFill/>
                 </a:ln>
@@ -5165,10 +5204,10 @@
                 <a:effectLst/>
                 <a:latin typeface="Georgia Pro" panose="02040502050405020303" pitchFamily="18" charset="0"/>
               </a:rPr>
-              <a:t>The Bottleneck:</a:t>
-            </a:r>
-            <a:r>
-              <a:rPr kumimoji="0" lang="en-US" altLang="en-US" sz="2000" b="0" i="0" u="none" strike="noStrike" cap="none" normalizeH="0" baseline="0">
+              <a:t> </a:t>
+            </a:r>
+            <a:r>
+              <a:rPr kumimoji="0" lang="en-US" altLang="en-US" sz="2000" b="0" i="0" u="none" strike="noStrike" cap="none" normalizeH="0" baseline="0" dirty="0">
                 <a:ln>
                   <a:noFill/>
                 </a:ln>
@@ -5178,7 +5217,26 @@
                 <a:effectLst/>
                 <a:latin typeface="Georgia Pro" panose="02040502050405020303" pitchFamily="18" charset="0"/>
               </a:rPr>
-              <a:t> Traditional methods struggle to handle this complexity. We need a way to compress this massive "cube" into essential features without losing the biology</a:t>
+              <a:t>Traditional methods struggle to handle this complexity</a:t>
+            </a:r>
+            <a:r>
+              <a:rPr lang="en-US" altLang="en-US" sz="2000" dirty="0">
+                <a:latin typeface="Georgia Pro" panose="02040502050405020303" pitchFamily="18" charset="0"/>
+              </a:rPr>
+              <a:t> and size</a:t>
+            </a:r>
+            <a:r>
+              <a:rPr kumimoji="0" lang="en-US" altLang="en-US" sz="2000" b="0" i="0" u="none" strike="noStrike" cap="none" normalizeH="0" baseline="0" dirty="0">
+                <a:ln>
+                  <a:noFill/>
+                </a:ln>
+                <a:solidFill>
+                  <a:schemeClr val="tx1"/>
+                </a:solidFill>
+                <a:effectLst/>
+                <a:latin typeface="Georgia Pro" panose="02040502050405020303" pitchFamily="18" charset="0"/>
+              </a:rPr>
+              <a:t>. We need a way to compress this massive "cube" into essential features without losing the biology</a:t>
             </a:r>
           </a:p>
         </p:txBody>
@@ -5235,8 +5293,8 @@
         </p:nvSpPr>
         <p:spPr bwMode="auto">
           <a:xfrm>
-            <a:off x="137160" y="9326705"/>
-            <a:ext cx="6202680" cy="5324535"/>
+            <a:off x="137160" y="9295928"/>
+            <a:ext cx="6202680" cy="5386090"/>
           </a:xfrm>
           <a:prstGeom prst="rect">
             <a:avLst/>
@@ -5300,7 +5358,7 @@
               <a:buNone/>
               <a:tabLst/>
             </a:pPr>
-            <a:endParaRPr kumimoji="0" lang="en-US" altLang="en-US" sz="2000" b="0" i="0" u="none" strike="noStrike" cap="none" normalizeH="0" baseline="0">
+            <a:endParaRPr kumimoji="0" lang="en-US" altLang="en-US" sz="2000" b="0" i="0" u="none" strike="noStrike" cap="none" normalizeH="0" baseline="0" dirty="0">
               <a:ln>
                 <a:noFill/>
               </a:ln>
@@ -5329,7 +5387,20 @@
               <a:tabLst/>
             </a:pPr>
             <a:r>
-              <a:rPr kumimoji="0" lang="en-US" altLang="en-US" sz="2000" b="1" i="0" u="none" strike="noStrike" cap="none" normalizeH="0" baseline="0">
+              <a:rPr kumimoji="0" lang="en-US" altLang="en-US" sz="2200" b="1" i="0" u="none" strike="noStrike" cap="none" normalizeH="0" baseline="0" dirty="0">
+                <a:ln>
+                  <a:noFill/>
+                </a:ln>
+                <a:solidFill>
+                  <a:srgbClr val="C00000"/>
+                </a:solidFill>
+                <a:effectLst/>
+                <a:latin typeface="Georgia Pro" panose="02040502050405020303" pitchFamily="18" charset="0"/>
+              </a:rPr>
+              <a:t>Preprocessing:</a:t>
+            </a:r>
+            <a:r>
+              <a:rPr kumimoji="0" lang="en-US" altLang="en-US" sz="2200" b="0" i="0" u="none" strike="noStrike" cap="none" normalizeH="0" baseline="0" dirty="0">
                 <a:ln>
                   <a:noFill/>
                 </a:ln>
@@ -5339,10 +5410,10 @@
                 <a:effectLst/>
                 <a:latin typeface="Georgia Pro" panose="02040502050405020303" pitchFamily="18" charset="0"/>
               </a:rPr>
-              <a:t>Preprocessing:</a:t>
-            </a:r>
-            <a:r>
-              <a:rPr kumimoji="0" lang="en-US" altLang="en-US" sz="2000" b="0" i="0" u="none" strike="noStrike" cap="none" normalizeH="0" baseline="0">
+              <a:t> </a:t>
+            </a:r>
+            <a:r>
+              <a:rPr kumimoji="0" lang="en-US" altLang="en-US" sz="2000" b="0" i="0" u="none" strike="noStrike" cap="none" normalizeH="0" baseline="0" dirty="0">
                 <a:ln>
                   <a:noFill/>
                 </a:ln>
@@ -5352,7 +5423,7 @@
                 <a:effectLst/>
                 <a:latin typeface="Georgia Pro" panose="02040502050405020303" pitchFamily="18" charset="0"/>
               </a:rPr>
-              <a:t> We cleaned the raw spectra using binning, Total Ion Current (TIC) normalization, and feature scaling to remove noise and technical artifacts.</a:t>
+              <a:t>We cleaned the raw spectra using binning, Total Ion Current (TIC) normalization, and feature scaling to remove noise and technical artifacts.</a:t>
             </a:r>
           </a:p>
           <a:p>
@@ -5373,7 +5444,20 @@
               <a:tabLst/>
             </a:pPr>
             <a:r>
-              <a:rPr kumimoji="0" lang="en-US" altLang="en-US" sz="2000" b="1" i="0" u="none" strike="noStrike" cap="none" normalizeH="0" baseline="0">
+              <a:rPr kumimoji="0" lang="en-US" altLang="en-US" sz="2200" b="1" i="0" u="none" strike="noStrike" cap="none" normalizeH="0" baseline="0" dirty="0">
+                <a:ln>
+                  <a:noFill/>
+                </a:ln>
+                <a:solidFill>
+                  <a:srgbClr val="C00000"/>
+                </a:solidFill>
+                <a:effectLst/>
+                <a:latin typeface="Georgia Pro" panose="02040502050405020303" pitchFamily="18" charset="0"/>
+              </a:rPr>
+              <a:t>The Contenders:</a:t>
+            </a:r>
+            <a:r>
+              <a:rPr kumimoji="0" lang="en-US" altLang="en-US" sz="2200" b="0" i="0" u="none" strike="noStrike" cap="none" normalizeH="0" baseline="0" dirty="0">
                 <a:ln>
                   <a:noFill/>
                 </a:ln>
@@ -5383,10 +5467,10 @@
                 <a:effectLst/>
                 <a:latin typeface="Georgia Pro" panose="02040502050405020303" pitchFamily="18" charset="0"/>
               </a:rPr>
-              <a:t>The Contenders:</a:t>
-            </a:r>
-            <a:r>
-              <a:rPr kumimoji="0" lang="en-US" altLang="en-US" sz="2000" b="0" i="0" u="none" strike="noStrike" cap="none" normalizeH="0" baseline="0">
+              <a:t> </a:t>
+            </a:r>
+            <a:r>
+              <a:rPr kumimoji="0" lang="en-US" altLang="en-US" sz="2000" b="0" i="0" u="none" strike="noStrike" cap="none" normalizeH="0" baseline="0" dirty="0">
                 <a:ln>
                   <a:noFill/>
                 </a:ln>
@@ -5396,7 +5480,7 @@
                 <a:effectLst/>
                 <a:latin typeface="Georgia Pro" panose="02040502050405020303" pitchFamily="18" charset="0"/>
               </a:rPr>
-              <a:t> We pitted deep learning against traditional math:</a:t>
+              <a:t>We pitted deep learning against traditional math:</a:t>
             </a:r>
           </a:p>
           <a:p>
@@ -5417,7 +5501,7 @@
               <a:tabLst/>
             </a:pPr>
             <a:r>
-              <a:rPr kumimoji="0" lang="en-US" altLang="en-US" sz="2000" b="0" i="1" u="none" strike="noStrike" cap="none" normalizeH="0" baseline="0">
+              <a:rPr kumimoji="0" lang="en-US" altLang="en-US" sz="2000" b="0" i="1" u="none" strike="noStrike" cap="none" normalizeH="0" baseline="0" dirty="0">
                 <a:ln>
                   <a:noFill/>
                 </a:ln>
@@ -5430,7 +5514,7 @@
               <a:t>Baselines:</a:t>
             </a:r>
             <a:r>
-              <a:rPr kumimoji="0" lang="en-US" altLang="en-US" sz="2000" b="0" i="0" u="none" strike="noStrike" cap="none" normalizeH="0" baseline="0">
+              <a:rPr kumimoji="0" lang="en-US" altLang="en-US" sz="2000" b="0" i="0" u="none" strike="noStrike" cap="none" normalizeH="0" baseline="0" dirty="0">
                 <a:ln>
                   <a:noFill/>
                 </a:ln>
@@ -5461,7 +5545,7 @@
               <a:tabLst/>
             </a:pPr>
             <a:r>
-              <a:rPr kumimoji="0" lang="en-US" altLang="en-US" sz="2000" b="0" i="1" u="none" strike="noStrike" cap="none" normalizeH="0" baseline="0">
+              <a:rPr kumimoji="0" lang="en-US" altLang="en-US" sz="2000" b="0" i="1" u="none" strike="noStrike" cap="none" normalizeH="0" baseline="0" dirty="0">
                 <a:ln>
                   <a:noFill/>
                 </a:ln>
@@ -5474,7 +5558,7 @@
               <a:t>Challengers:</a:t>
             </a:r>
             <a:r>
-              <a:rPr kumimoji="0" lang="en-US" altLang="en-US" sz="2000" b="0" i="0" u="none" strike="noStrike" cap="none" normalizeH="0" baseline="0">
+              <a:rPr kumimoji="0" lang="en-US" altLang="en-US" sz="2000" b="0" i="0" u="none" strike="noStrike" cap="none" normalizeH="0" baseline="0" dirty="0">
                 <a:ln>
                   <a:noFill/>
                 </a:ln>
@@ -5505,7 +5589,33 @@
               <a:tabLst/>
             </a:pPr>
             <a:r>
-              <a:rPr kumimoji="0" lang="en-US" altLang="en-US" sz="2000" b="1" i="0" u="none" strike="noStrike" cap="none" normalizeH="0" baseline="0">
+              <a:rPr kumimoji="0" lang="en-US" altLang="en-US" sz="2200" b="1" i="0" u="none" strike="noStrike" cap="none" normalizeH="0" baseline="0" dirty="0">
+                <a:ln>
+                  <a:noFill/>
+                </a:ln>
+                <a:solidFill>
+                  <a:srgbClr val="C00000"/>
+                </a:solidFill>
+                <a:effectLst/>
+                <a:latin typeface="Georgia Pro" panose="02040502050405020303" pitchFamily="18" charset="0"/>
+              </a:rPr>
+              <a:t>The Strategy</a:t>
+            </a:r>
+            <a:r>
+              <a:rPr kumimoji="0" lang="en-US" altLang="en-US" sz="2000" b="1" i="0" u="none" strike="noStrike" cap="none" normalizeH="0" baseline="0" dirty="0">
+                <a:ln>
+                  <a:noFill/>
+                </a:ln>
+                <a:solidFill>
+                  <a:srgbClr val="C00000"/>
+                </a:solidFill>
+                <a:effectLst/>
+                <a:latin typeface="Georgia Pro" panose="02040502050405020303" pitchFamily="18" charset="0"/>
+              </a:rPr>
+              <a:t>:</a:t>
+            </a:r>
+            <a:r>
+              <a:rPr kumimoji="0" lang="en-US" altLang="en-US" sz="2000" b="0" i="0" u="none" strike="noStrike" cap="none" normalizeH="0" baseline="0" dirty="0">
                 <a:ln>
                   <a:noFill/>
                 </a:ln>
@@ -5515,10 +5625,16 @@
                 <a:effectLst/>
                 <a:latin typeface="Georgia Pro" panose="02040502050405020303" pitchFamily="18" charset="0"/>
               </a:rPr>
-              <a:t>The Strategy:</a:t>
-            </a:r>
-            <a:r>
-              <a:rPr kumimoji="0" lang="en-US" altLang="en-US" sz="2000" b="0" i="0" u="none" strike="noStrike" cap="none" normalizeH="0" baseline="0">
+              <a:t> We trained the Neural Networks to compress the spectra into a </a:t>
+            </a:r>
+            <a:r>
+              <a:rPr lang="en-US" altLang="en-US" sz="2000" dirty="0">
+                <a:latin typeface="Georgia Pro" panose="02040502050405020303" pitchFamily="18" charset="0"/>
+              </a:rPr>
+              <a:t>small </a:t>
+            </a:r>
+            <a:r>
+              <a:rPr kumimoji="0" lang="en-US" altLang="en-US" sz="2000" b="0" i="0" u="none" strike="noStrike" cap="none" normalizeH="0" baseline="0" dirty="0">
                 <a:ln>
                   <a:noFill/>
                 </a:ln>
@@ -5528,10 +5644,23 @@
                 <a:effectLst/>
                 <a:latin typeface="Georgia Pro" panose="02040502050405020303" pitchFamily="18" charset="0"/>
               </a:rPr>
-              <a:t> We trained the Neural Networks to compress the spectra into a tiny "latent space" (200 features) and then reconstruct them. We used a special </a:t>
-            </a:r>
-            <a:r>
-              <a:rPr kumimoji="0" lang="en-US" altLang="en-US" sz="2000" b="1" i="0" u="none" strike="noStrike" cap="none" normalizeH="0" baseline="0">
+              <a:t>latent space (200 features) and then reconstruct them. We used a special </a:t>
+            </a:r>
+            <a:r>
+              <a:rPr kumimoji="0" lang="en-US" altLang="en-US" sz="2000" b="1" i="0" u="none" strike="noStrike" cap="none" normalizeH="0" baseline="0" dirty="0">
+                <a:ln>
+                  <a:noFill/>
+                </a:ln>
+                <a:solidFill>
+                  <a:srgbClr val="00B050"/>
+                </a:solidFill>
+                <a:effectLst/>
+                <a:latin typeface="Georgia Pro" panose="02040502050405020303" pitchFamily="18" charset="0"/>
+              </a:rPr>
+              <a:t>Weighted MSE Loss</a:t>
+            </a:r>
+            <a:r>
+              <a:rPr kumimoji="0" lang="en-US" altLang="en-US" sz="2000" b="0" i="0" u="none" strike="noStrike" cap="none" normalizeH="0" baseline="0" dirty="0">
                 <a:ln>
                   <a:noFill/>
                 </a:ln>
@@ -5541,20 +5670,7 @@
                 <a:effectLst/>
                 <a:latin typeface="Georgia Pro" panose="02040502050405020303" pitchFamily="18" charset="0"/>
               </a:rPr>
-              <a:t>Weighted MSE Loss</a:t>
-            </a:r>
-            <a:r>
-              <a:rPr kumimoji="0" lang="en-US" altLang="en-US" sz="2000" b="0" i="0" u="none" strike="noStrike" cap="none" normalizeH="0" baseline="0">
-                <a:ln>
-                  <a:noFill/>
-                </a:ln>
-                <a:solidFill>
-                  <a:schemeClr val="tx1"/>
-                </a:solidFill>
-                <a:effectLst/>
-                <a:latin typeface="Georgia Pro" panose="02040502050405020303" pitchFamily="18" charset="0"/>
-              </a:rPr>
-              <a:t> to force the AI to focus on chemical peaks, not just empty space.</a:t>
+              <a:t> to force the models to focus on chemical peaks, not just space.</a:t>
             </a:r>
           </a:p>
           <a:p>
@@ -5574,7 +5690,7 @@
               <a:buNone/>
               <a:tabLst/>
             </a:pPr>
-            <a:endParaRPr kumimoji="0" lang="en-US" altLang="en-US" sz="2000" b="0" i="0" u="none" strike="noStrike" cap="none" normalizeH="0" baseline="0">
+            <a:endParaRPr kumimoji="0" lang="en-US" altLang="en-US" sz="2000" b="0" i="0" u="none" strike="noStrike" cap="none" normalizeH="0" baseline="0" dirty="0">
               <a:ln>
                 <a:noFill/>
               </a:ln>
@@ -5648,7 +5764,7 @@
         <p:spPr>
           <a:xfrm>
             <a:off x="7275060" y="12172395"/>
-            <a:ext cx="5729887" cy="369332"/>
+            <a:ext cx="5729887" cy="400110"/>
           </a:xfrm>
           <a:prstGeom prst="rect">
             <a:avLst/>
@@ -5662,12 +5778,12 @@
           <a:lstStyle/>
           <a:p>
             <a:r>
-              <a:rPr lang="en-GB">
+              <a:rPr lang="en-GB" sz="2000" dirty="0">
                 <a:latin typeface="Georgia Pro" panose="02040502050405020303" pitchFamily="18" charset="0"/>
               </a:rPr>
               <a:t>Raw cancer tissue section at m/z ratio 390 Da. </a:t>
             </a:r>
-            <a:endParaRPr lang="en-ZA">
+            <a:endParaRPr lang="en-ZA" sz="2000" dirty="0">
               <a:latin typeface="Georgia Pro" panose="02040502050405020303" pitchFamily="18" charset="0"/>
             </a:endParaRPr>
           </a:p>
@@ -5725,7 +5841,7 @@
         <p:spPr>
           <a:xfrm>
             <a:off x="15142369" y="12033895"/>
-            <a:ext cx="5729887" cy="646331"/>
+            <a:ext cx="5729887" cy="707886"/>
           </a:xfrm>
           <a:prstGeom prst="rect">
             <a:avLst/>
@@ -5739,13 +5855,13 @@
           <a:lstStyle/>
           <a:p>
             <a:r>
-              <a:rPr lang="en-GB">
+              <a:rPr lang="en-GB" sz="2000" dirty="0">
                 <a:latin typeface="Georgia Pro" panose="02040502050405020303" pitchFamily="18" charset="0"/>
               </a:rPr>
               <a:t>Autoencoder architecture (</a:t>
             </a:r>
             <a:r>
-              <a:rPr lang="en-GB">
+              <a:rPr lang="en-GB" sz="2000" dirty="0">
                 <a:solidFill>
                   <a:srgbClr val="C00000"/>
                 </a:solidFill>
@@ -5754,13 +5870,13 @@
               <a:t>Encoder </a:t>
             </a:r>
             <a:r>
-              <a:rPr lang="en-GB">
+              <a:rPr lang="en-GB" sz="2000" dirty="0">
                 <a:latin typeface="Georgia Pro" panose="02040502050405020303" pitchFamily="18" charset="0"/>
               </a:rPr>
               <a:t>-&gt; </a:t>
             </a:r>
             <a:r>
-              <a:rPr lang="en-GB">
+              <a:rPr lang="en-GB" sz="2000" dirty="0">
                 <a:solidFill>
                   <a:srgbClr val="0070C0"/>
                 </a:solidFill>
@@ -5769,13 +5885,13 @@
               <a:t>Latent Space</a:t>
             </a:r>
             <a:r>
-              <a:rPr lang="en-GB">
+              <a:rPr lang="en-GB" sz="2000" dirty="0">
                 <a:latin typeface="Georgia Pro" panose="02040502050405020303" pitchFamily="18" charset="0"/>
               </a:rPr>
               <a:t> -&gt; </a:t>
             </a:r>
             <a:r>
-              <a:rPr lang="en-GB">
+              <a:rPr lang="en-GB" sz="2000" dirty="0">
                 <a:solidFill>
                   <a:srgbClr val="00B050"/>
                 </a:solidFill>
@@ -5784,12 +5900,12 @@
               <a:t>Decoder</a:t>
             </a:r>
             <a:r>
-              <a:rPr lang="en-GB">
+              <a:rPr lang="en-GB" sz="2000" dirty="0">
                 <a:latin typeface="Georgia Pro" panose="02040502050405020303" pitchFamily="18" charset="0"/>
               </a:rPr>
               <a:t>) </a:t>
             </a:r>
-            <a:endParaRPr lang="en-ZA">
+            <a:endParaRPr lang="en-ZA" sz="2000" dirty="0">
               <a:latin typeface="Georgia Pro" panose="02040502050405020303" pitchFamily="18" charset="0"/>
             </a:endParaRPr>
           </a:p>
@@ -5853,7 +5969,7 @@
         <p:spPr>
           <a:xfrm>
             <a:off x="15125350" y="18346669"/>
-            <a:ext cx="6522551" cy="923330"/>
+            <a:ext cx="6522551" cy="1015663"/>
           </a:xfrm>
           <a:prstGeom prst="rect">
             <a:avLst/>
@@ -5867,12 +5983,12 @@
           <a:lstStyle/>
           <a:p>
             <a:r>
-              <a:rPr lang="en-GB">
+              <a:rPr lang="en-GB" sz="2000" dirty="0">
                 <a:latin typeface="Georgia Pro" panose="02040502050405020303" pitchFamily="18" charset="0"/>
               </a:rPr>
               <a:t>Generalization to Unseen Data: The Fully-Connected AE achieves the highest predictive performance (AUC 0.87), proving it captures robust, transferable features.</a:t>
             </a:r>
-            <a:endParaRPr lang="en-ZA">
+            <a:endParaRPr lang="en-ZA" sz="2000" dirty="0">
               <a:latin typeface="Georgia Pro" panose="02040502050405020303" pitchFamily="18" charset="0"/>
             </a:endParaRPr>
           </a:p>
@@ -5936,7 +6052,7 @@
         <p:spPr>
           <a:xfrm>
             <a:off x="22989146" y="12172395"/>
-            <a:ext cx="5750419" cy="923330"/>
+            <a:ext cx="5750419" cy="1015663"/>
           </a:xfrm>
           <a:prstGeom prst="rect">
             <a:avLst/>
@@ -5950,12 +6066,12 @@
           <a:lstStyle/>
           <a:p>
             <a:r>
-              <a:rPr lang="en-GB">
+              <a:rPr lang="en-GB" sz="2000" dirty="0">
                 <a:latin typeface="Georgia Pro" panose="02040502050405020303" pitchFamily="18" charset="0"/>
               </a:rPr>
               <a:t>The t-SNE plot of the CNN-AE (the one with distinct islands). The CNN-AE separates biochemical profiles into distinct, clean clusters.</a:t>
             </a:r>
-            <a:endParaRPr lang="en-ZA">
+            <a:endParaRPr lang="en-ZA" sz="2000" dirty="0">
               <a:latin typeface="Georgia Pro" panose="02040502050405020303" pitchFamily="18" charset="0"/>
             </a:endParaRPr>
           </a:p>
@@ -6012,7 +6128,7 @@
         <p:spPr>
           <a:xfrm>
             <a:off x="23041859" y="18489125"/>
-            <a:ext cx="6062998" cy="646331"/>
+            <a:ext cx="6062998" cy="707886"/>
           </a:xfrm>
           <a:prstGeom prst="rect">
             <a:avLst/>
@@ -6029,14 +6145,14 @@
           <a:lstStyle/>
           <a:p>
             <a:r>
-              <a:rPr lang="en-US" dirty="0">
+              <a:rPr lang="en-US" sz="2000" dirty="0">
                 <a:latin typeface="Georgia Pro"/>
                 <a:ea typeface="+mn-lt"/>
                 <a:cs typeface="+mn-lt"/>
               </a:rPr>
               <a:t>The first deep representation learning benchmark for MSI in the African context!</a:t>
             </a:r>
-            <a:endParaRPr lang="en-US" dirty="0">
+            <a:endParaRPr lang="en-US" sz="2000" dirty="0">
               <a:latin typeface="Georgia Pro"/>
             </a:endParaRPr>
           </a:p>
@@ -6057,7 +6173,7 @@
         <p:spPr>
           <a:xfrm>
             <a:off x="129298" y="15730258"/>
-            <a:ext cx="6356775" cy="4708981"/>
+            <a:ext cx="6356775" cy="4462760"/>
           </a:xfrm>
           <a:prstGeom prst="rect">
             <a:avLst/>
@@ -6074,7 +6190,10 @@
           <a:lstStyle/>
           <a:p>
             <a:r>
-              <a:rPr lang="en-US" sz="2000" b="1" dirty="0">
+              <a:rPr lang="en-US" sz="2200" b="1" dirty="0">
+                <a:solidFill>
+                  <a:srgbClr val="C00000"/>
+                </a:solidFill>
                 <a:latin typeface="Georgia Pro"/>
                 <a:ea typeface="+mn-lt"/>
                 <a:cs typeface="+mn-lt"/>
@@ -6096,6 +6215,9 @@
           <a:p>
             <a:r>
               <a:rPr lang="en-US" sz="2000" b="1" dirty="0">
+                <a:solidFill>
+                  <a:srgbClr val="C00000"/>
+                </a:solidFill>
                 <a:latin typeface="Georgia Pro"/>
                 <a:ea typeface="+mn-lt"/>
                 <a:cs typeface="+mn-lt"/>
@@ -6103,6 +6225,9 @@
               <a:t>The Trade-Off:</a:t>
             </a:r>
             <a:endParaRPr lang="en-US" sz="2000" dirty="0">
+              <a:solidFill>
+                <a:srgbClr val="C00000"/>
+              </a:solidFill>
               <a:latin typeface="Georgia Pro"/>
             </a:endParaRPr>
           </a:p>
@@ -6111,13 +6236,60 @@
               <a:buFont typeface="Arial"/>
               <a:buChar char="•"/>
             </a:pPr>
+            <a:r>
+              <a:rPr lang="en-US" sz="2000" b="1" dirty="0">
+                <a:solidFill>
+                  <a:srgbClr val="00B050"/>
+                </a:solidFill>
+                <a:latin typeface="Georgia Pro"/>
+                <a:ea typeface="+mn-lt"/>
+                <a:cs typeface="+mn-lt"/>
+              </a:rPr>
+              <a:t>CNN-AE:</a:t>
+            </a:r>
+            <a:r>
+              <a:rPr lang="en-US" sz="2000" dirty="0">
+                <a:latin typeface="Georgia Pro"/>
+                <a:ea typeface="+mn-lt"/>
+                <a:cs typeface="+mn-lt"/>
+              </a:rPr>
+              <a:t> Creates the most beautiful, separated clusters (best for exploring data).</a:t>
+            </a:r>
+            <a:endParaRPr lang="en-US" sz="2000" dirty="0">
+              <a:latin typeface="Georgia Pro"/>
+            </a:endParaRPr>
+          </a:p>
+          <a:p>
+            <a:pPr marL="342900" indent="-342900">
+              <a:buFont typeface="Arial" panose="020B0604020202020204" pitchFamily="34" charset="0"/>
+              <a:buChar char="•"/>
+            </a:pPr>
+            <a:r>
+              <a:rPr lang="en-US" sz="2000" b="1" dirty="0">
+                <a:solidFill>
+                  <a:srgbClr val="00B050"/>
+                </a:solidFill>
+                <a:latin typeface="Georgia Pro"/>
+                <a:ea typeface="+mn-lt"/>
+                <a:cs typeface="+mn-lt"/>
+              </a:rPr>
+              <a:t>Fully-Connected AE:</a:t>
+            </a:r>
+            <a:r>
+              <a:rPr lang="en-US" sz="2000" dirty="0">
+                <a:latin typeface="Georgia Pro"/>
+                <a:ea typeface="+mn-lt"/>
+                <a:cs typeface="+mn-lt"/>
+              </a:rPr>
+              <a:t> It was the most reliable. It reconstructed the images perfectly and was the </a:t>
+            </a:r>
             <a:r>
               <a:rPr lang="en-US" sz="2000" b="1" dirty="0">
                 <a:latin typeface="Georgia Pro"/>
                 <a:ea typeface="+mn-lt"/>
                 <a:cs typeface="+mn-lt"/>
               </a:rPr>
-              <a:t>CNN-AE:</a:t>
+              <a:t>best model </a:t>
             </a:r>
             <a:r>
               <a:rPr lang="en-US" sz="2000" dirty="0">
@@ -6125,20 +6297,28 @@
                 <a:ea typeface="+mn-lt"/>
                 <a:cs typeface="+mn-lt"/>
               </a:rPr>
-              <a:t> The "Artist." It created the most beautiful, separated clusters (best for exploring data).</a:t>
-            </a:r>
-            <a:endParaRPr lang="en-US" sz="2000" dirty="0">
-              <a:latin typeface="Georgia Pro"/>
-            </a:endParaRPr>
-          </a:p>
-          <a:p>
+              <a:t>to classify disease on a completely new, unseen dataset.</a:t>
+            </a:r>
+          </a:p>
+          <a:p>
+            <a:r>
+              <a:rPr lang="en-US" sz="2200" b="1" dirty="0">
+                <a:solidFill>
+                  <a:srgbClr val="C00000"/>
+                </a:solidFill>
+                <a:latin typeface="Georgia Pro"/>
+                <a:ea typeface="+mn-lt"/>
+                <a:cs typeface="+mn-lt"/>
+              </a:rPr>
+              <a:t>Conclusion</a:t>
+            </a:r>
             <a:r>
               <a:rPr lang="en-US" sz="2000" b="1" dirty="0">
                 <a:latin typeface="Georgia Pro"/>
                 <a:ea typeface="+mn-lt"/>
                 <a:cs typeface="+mn-lt"/>
               </a:rPr>
-              <a:t>Fully-Connected AE:</a:t>
+              <a:t>:</a:t>
             </a:r>
             <a:r>
               <a:rPr lang="en-US" sz="2000" dirty="0">
@@ -6146,15 +6326,13 @@
                 <a:ea typeface="+mn-lt"/>
                 <a:cs typeface="+mn-lt"/>
               </a:rPr>
-              <a:t> The "Engineer." It was the most reliable. It reconstructed the images perfectly and was the </a:t>
-            </a:r>
-            <a:r>
-              <a:rPr lang="en-US" sz="2000" b="1" dirty="0">
-                <a:latin typeface="Georgia Pro"/>
-                <a:ea typeface="+mn-lt"/>
-                <a:cs typeface="+mn-lt"/>
+              <a:t> </a:t>
+            </a:r>
+            <a:r>
+              <a:rPr lang="en-US" sz="2000" dirty="0">
+                <a:latin typeface="Georgia Pro" panose="02040502050405020303" pitchFamily="18" charset="0"/>
               </a:rPr>
-              <a:t>only model</a:t>
+              <a:t>To identify patterns, utilize</a:t>
             </a:r>
             <a:r>
               <a:rPr lang="en-US" sz="2000" dirty="0">
@@ -6162,41 +6340,7 @@
                 <a:ea typeface="+mn-lt"/>
                 <a:cs typeface="+mn-lt"/>
               </a:rPr>
-              <a:t> to accurately classify disease on a completely new, unseen dataset.</a:t>
-            </a:r>
-          </a:p>
-          <a:p>
-            <a:r>
-              <a:rPr lang="en-US" sz="2000" b="1" dirty="0">
-                <a:latin typeface="Georgia Pro"/>
-                <a:ea typeface="+mn-lt"/>
-                <a:cs typeface="+mn-lt"/>
-              </a:rPr>
-              <a:t>Conclusion:</a:t>
-            </a:r>
-            <a:r>
-              <a:rPr lang="en-US" sz="2000" dirty="0">
-                <a:latin typeface="Georgia Pro"/>
-                <a:ea typeface="+mn-lt"/>
-                <a:cs typeface="+mn-lt"/>
-              </a:rPr>
-              <a:t> If you want to </a:t>
-            </a:r>
-            <a:r>
-              <a:rPr lang="en-US" sz="2000" i="1" dirty="0">
-                <a:latin typeface="Georgia Pro"/>
-                <a:ea typeface="+mn-lt"/>
-                <a:cs typeface="+mn-lt"/>
-              </a:rPr>
-              <a:t>see</a:t>
-            </a:r>
-            <a:r>
-              <a:rPr lang="en-US" sz="2000" dirty="0">
-                <a:latin typeface="Georgia Pro"/>
-                <a:ea typeface="+mn-lt"/>
-                <a:cs typeface="+mn-lt"/>
-              </a:rPr>
-              <a:t> patterns, use CNNs. If you want to </a:t>
+              <a:t> CNNs. If you’re going to </a:t>
             </a:r>
             <a:r>
               <a:rPr lang="en-US" sz="2000" i="1" dirty="0">
@@ -6275,8 +6419,8 @@
         </p:nvSpPr>
         <p:spPr>
           <a:xfrm>
-            <a:off x="7283396" y="18337722"/>
-            <a:ext cx="6507757" cy="944890"/>
+            <a:off x="7277391" y="18283421"/>
+            <a:ext cx="6507757" cy="1015663"/>
           </a:xfrm>
           <a:prstGeom prst="rect">
             <a:avLst/>
@@ -6294,7 +6438,7 @@
           <a:p>
             <a:pPr algn="l"/>
             <a:r>
-              <a:rPr lang="en-US" dirty="0">
+              <a:rPr lang="en-US" sz="2000" dirty="0">
                 <a:latin typeface="Georgia Pro"/>
               </a:rPr>
               <a:t>From Spectra to Structure: Mapping latent clusters back to the tissue reveals biologically distinct regions without any human annotation.</a:t>
@@ -6330,6 +6474,13 @@
           <a:prstGeom prst="rect">
             <a:avLst/>
           </a:prstGeom>
+          <a:effectLst>
+            <a:outerShdw blurRad="63500" sx="102000" sy="102000" algn="ctr" rotWithShape="0">
+              <a:prstClr val="black">
+                <a:alpha val="40000"/>
+              </a:prstClr>
+            </a:outerShdw>
+          </a:effectLst>
         </p:spPr>
       </p:pic>
       <p:pic>

</xml_diff>